<commit_message>
added alternative onion diagram
</commit_message>
<xml_diff>
--- a/resources/reference-bubbles.pptx
+++ b/resources/reference-bubbles.pptx
@@ -6,6 +6,7 @@
   </p:sldMasterIdLst>
   <p:sldIdLst>
     <p:sldId id="256" r:id="rId2"/>
+    <p:sldId id="257" r:id="rId3"/>
   </p:sldIdLst>
   <p:sldSz cx="12192000" cy="6858000"/>
   <p:notesSz cx="6858000" cy="9144000"/>
@@ -104,6 +105,11 @@
       </a:defRPr>
     </a:lvl9pPr>
   </p:defaultTextStyle>
+  <p:extLst>
+    <p:ext uri="{EFAFB233-063F-42B5-8137-9DF3F51BA10A}">
+      <p15:sldGuideLst xmlns:p15="http://schemas.microsoft.com/office/powerpoint/2012/main"/>
+    </p:ext>
+  </p:extLst>
 </p:presentation>
 </file>
 
@@ -256,7 +262,7 @@
           <a:p>
             <a:fld id="{E107F2B0-9498-E242-8656-3697A562F0F4}" type="datetimeFigureOut">
               <a:rPr lang="en-DE" smtClean="0"/>
-              <a:t>28.01.23</a:t>
+              <a:t>02/02/2023</a:t>
             </a:fld>
             <a:endParaRPr lang="en-DE"/>
           </a:p>
@@ -456,7 +462,7 @@
           <a:p>
             <a:fld id="{E107F2B0-9498-E242-8656-3697A562F0F4}" type="datetimeFigureOut">
               <a:rPr lang="en-DE" smtClean="0"/>
-              <a:t>28.01.23</a:t>
+              <a:t>02/02/2023</a:t>
             </a:fld>
             <a:endParaRPr lang="en-DE"/>
           </a:p>
@@ -666,7 +672,7 @@
           <a:p>
             <a:fld id="{E107F2B0-9498-E242-8656-3697A562F0F4}" type="datetimeFigureOut">
               <a:rPr lang="en-DE" smtClean="0"/>
-              <a:t>28.01.23</a:t>
+              <a:t>02/02/2023</a:t>
             </a:fld>
             <a:endParaRPr lang="en-DE"/>
           </a:p>
@@ -866,7 +872,7 @@
           <a:p>
             <a:fld id="{E107F2B0-9498-E242-8656-3697A562F0F4}" type="datetimeFigureOut">
               <a:rPr lang="en-DE" smtClean="0"/>
-              <a:t>28.01.23</a:t>
+              <a:t>02/02/2023</a:t>
             </a:fld>
             <a:endParaRPr lang="en-DE"/>
           </a:p>
@@ -1142,7 +1148,7 @@
           <a:p>
             <a:fld id="{E107F2B0-9498-E242-8656-3697A562F0F4}" type="datetimeFigureOut">
               <a:rPr lang="en-DE" smtClean="0"/>
-              <a:t>28.01.23</a:t>
+              <a:t>02/02/2023</a:t>
             </a:fld>
             <a:endParaRPr lang="en-DE"/>
           </a:p>
@@ -1410,7 +1416,7 @@
           <a:p>
             <a:fld id="{E107F2B0-9498-E242-8656-3697A562F0F4}" type="datetimeFigureOut">
               <a:rPr lang="en-DE" smtClean="0"/>
-              <a:t>28.01.23</a:t>
+              <a:t>02/02/2023</a:t>
             </a:fld>
             <a:endParaRPr lang="en-DE"/>
           </a:p>
@@ -1825,7 +1831,7 @@
           <a:p>
             <a:fld id="{E107F2B0-9498-E242-8656-3697A562F0F4}" type="datetimeFigureOut">
               <a:rPr lang="en-DE" smtClean="0"/>
-              <a:t>28.01.23</a:t>
+              <a:t>02/02/2023</a:t>
             </a:fld>
             <a:endParaRPr lang="en-DE"/>
           </a:p>
@@ -1967,7 +1973,7 @@
           <a:p>
             <a:fld id="{E107F2B0-9498-E242-8656-3697A562F0F4}" type="datetimeFigureOut">
               <a:rPr lang="en-DE" smtClean="0"/>
-              <a:t>28.01.23</a:t>
+              <a:t>02/02/2023</a:t>
             </a:fld>
             <a:endParaRPr lang="en-DE"/>
           </a:p>
@@ -2080,7 +2086,7 @@
           <a:p>
             <a:fld id="{E107F2B0-9498-E242-8656-3697A562F0F4}" type="datetimeFigureOut">
               <a:rPr lang="en-DE" smtClean="0"/>
-              <a:t>28.01.23</a:t>
+              <a:t>02/02/2023</a:t>
             </a:fld>
             <a:endParaRPr lang="en-DE"/>
           </a:p>
@@ -2393,7 +2399,7 @@
           <a:p>
             <a:fld id="{E107F2B0-9498-E242-8656-3697A562F0F4}" type="datetimeFigureOut">
               <a:rPr lang="en-DE" smtClean="0"/>
-              <a:t>28.01.23</a:t>
+              <a:t>02/02/2023</a:t>
             </a:fld>
             <a:endParaRPr lang="en-DE"/>
           </a:p>
@@ -2682,7 +2688,7 @@
           <a:p>
             <a:fld id="{E107F2B0-9498-E242-8656-3697A562F0F4}" type="datetimeFigureOut">
               <a:rPr lang="en-DE" smtClean="0"/>
-              <a:t>28.01.23</a:t>
+              <a:t>02/02/2023</a:t>
             </a:fld>
             <a:endParaRPr lang="en-DE"/>
           </a:p>
@@ -2925,7 +2931,7 @@
           <a:p>
             <a:fld id="{E107F2B0-9498-E242-8656-3697A562F0F4}" type="datetimeFigureOut">
               <a:rPr lang="en-DE" smtClean="0"/>
-              <a:t>28.01.23</a:t>
+              <a:t>02/02/2023</a:t>
             </a:fld>
             <a:endParaRPr lang="en-DE"/>
           </a:p>
@@ -4699,6 +4705,1434 @@
 </p:sld>
 </file>
 
+<file path=ppt/slides/slide2.xml><?xml version="1.0" encoding="utf-8"?>
+<p:sld xmlns:a="http://schemas.openxmlformats.org/drawingml/2006/main" xmlns:r="http://schemas.openxmlformats.org/officeDocument/2006/relationships" xmlns:p="http://schemas.openxmlformats.org/presentationml/2006/main">
+  <p:cSld>
+    <p:spTree>
+      <p:nvGrpSpPr>
+        <p:cNvPr id="1" name=""/>
+        <p:cNvGrpSpPr/>
+        <p:nvPr/>
+      </p:nvGrpSpPr>
+      <p:grpSpPr>
+        <a:xfrm>
+          <a:off x="0" y="0"/>
+          <a:ext cx="0" cy="0"/>
+          <a:chOff x="0" y="0"/>
+          <a:chExt cx="0" cy="0"/>
+        </a:xfrm>
+      </p:grpSpPr>
+      <p:sp>
+        <p:nvSpPr>
+          <p:cNvPr id="15" name="TextBox 14">
+            <a:extLst>
+              <a:ext uri="{FF2B5EF4-FFF2-40B4-BE49-F238E27FC236}">
+                <a16:creationId xmlns:a16="http://schemas.microsoft.com/office/drawing/2014/main" id="{748971FE-1390-384D-2F28-1393DCACE6A1}"/>
+              </a:ext>
+            </a:extLst>
+          </p:cNvPr>
+          <p:cNvSpPr txBox="1"/>
+          <p:nvPr/>
+        </p:nvSpPr>
+        <p:spPr>
+          <a:xfrm>
+            <a:off x="5863564" y="360000"/>
+            <a:ext cx="6114494" cy="646331"/>
+          </a:xfrm>
+          <a:prstGeom prst="rect">
+            <a:avLst/>
+          </a:prstGeom>
+          <a:noFill/>
+        </p:spPr>
+        <p:txBody>
+          <a:bodyPr wrap="none" rtlCol="0">
+            <a:spAutoFit/>
+          </a:bodyPr>
+          <a:lstStyle/>
+          <a:p>
+            <a:r>
+              <a:rPr lang="en-US" dirty="0"/>
+              <a:t>Everything we talk about is a Node in a tree and has a Concept,</a:t>
+            </a:r>
+          </a:p>
+          <a:p>
+            <a:r>
+              <a:rPr lang="en-US" dirty="0"/>
+              <a:t>defined by our meta-metamodel</a:t>
+            </a:r>
+          </a:p>
+        </p:txBody>
+      </p:sp>
+      <p:sp>
+        <p:nvSpPr>
+          <p:cNvPr id="28" name="TextBox 27">
+            <a:extLst>
+              <a:ext uri="{FF2B5EF4-FFF2-40B4-BE49-F238E27FC236}">
+                <a16:creationId xmlns:a16="http://schemas.microsoft.com/office/drawing/2014/main" id="{1C4A2A99-73CA-C552-293D-4DEDF5B0FDB7}"/>
+              </a:ext>
+            </a:extLst>
+          </p:cNvPr>
+          <p:cNvSpPr txBox="1"/>
+          <p:nvPr/>
+        </p:nvSpPr>
+        <p:spPr>
+          <a:xfrm>
+            <a:off x="5863884" y="1248169"/>
+            <a:ext cx="3978653" cy="2031325"/>
+          </a:xfrm>
+          <a:prstGeom prst="rect">
+            <a:avLst/>
+          </a:prstGeom>
+          <a:noFill/>
+        </p:spPr>
+        <p:txBody>
+          <a:bodyPr wrap="none" rtlCol="0">
+            <a:spAutoFit/>
+          </a:bodyPr>
+          <a:lstStyle/>
+          <a:p>
+            <a:r>
+              <a:rPr lang="en-US" dirty="0"/>
+              <a:t>We specify protocols for:</a:t>
+            </a:r>
+          </a:p>
+          <a:p>
+            <a:pPr marL="285750" indent="-285750">
+              <a:buFont typeface="Arial" panose="020B0604020202020204" pitchFamily="34" charset="0"/>
+              <a:buChar char="•"/>
+            </a:pPr>
+            <a:r>
+              <a:rPr lang="en-US" dirty="0"/>
+              <a:t>Bulk node request/storage</a:t>
+            </a:r>
+          </a:p>
+          <a:p>
+            <a:pPr marL="285750" indent="-285750">
+              <a:buFont typeface="Arial" panose="020B0604020202020204" pitchFamily="34" charset="0"/>
+              <a:buChar char="•"/>
+            </a:pPr>
+            <a:r>
+              <a:rPr lang="en-US" dirty="0"/>
+              <a:t>Delta node notification/change</a:t>
+            </a:r>
+          </a:p>
+          <a:p>
+            <a:pPr marL="285750" indent="-285750">
+              <a:buFont typeface="Arial" panose="020B0604020202020204" pitchFamily="34" charset="0"/>
+              <a:buChar char="•"/>
+            </a:pPr>
+            <a:r>
+              <a:rPr lang="en-US" dirty="0"/>
+              <a:t>Service-specific commands</a:t>
+            </a:r>
+          </a:p>
+          <a:p>
+            <a:r>
+              <a:rPr lang="en-US" dirty="0"/>
+              <a:t>They might communicate via</a:t>
+            </a:r>
+          </a:p>
+          <a:p>
+            <a:pPr marL="285750" indent="-285750">
+              <a:buFont typeface="Arial" panose="020B0604020202020204" pitchFamily="34" charset="0"/>
+              <a:buChar char="•"/>
+            </a:pPr>
+            <a:r>
+              <a:rPr lang="en-US" dirty="0"/>
+              <a:t>REST-JSON (main focus)</a:t>
+            </a:r>
+          </a:p>
+          <a:p>
+            <a:pPr marL="285750" indent="-285750">
+              <a:buFont typeface="Arial" panose="020B0604020202020204" pitchFamily="34" charset="0"/>
+              <a:buChar char="•"/>
+            </a:pPr>
+            <a:r>
+              <a:rPr lang="en-US" dirty="0">
+                <a:solidFill>
+                  <a:schemeClr val="bg1">
+                    <a:lumMod val="50000"/>
+                  </a:schemeClr>
+                </a:solidFill>
+              </a:rPr>
+              <a:t>Java API (single-process optimization)</a:t>
+            </a:r>
+          </a:p>
+        </p:txBody>
+      </p:sp>
+      <p:sp>
+        <p:nvSpPr>
+          <p:cNvPr id="30" name="TextBox 29">
+            <a:extLst>
+              <a:ext uri="{FF2B5EF4-FFF2-40B4-BE49-F238E27FC236}">
+                <a16:creationId xmlns:a16="http://schemas.microsoft.com/office/drawing/2014/main" id="{17F45B3B-9148-2AC4-100E-EEF5B40D2EFE}"/>
+              </a:ext>
+            </a:extLst>
+          </p:cNvPr>
+          <p:cNvSpPr txBox="1"/>
+          <p:nvPr/>
+        </p:nvSpPr>
+        <p:spPr>
+          <a:xfrm>
+            <a:off x="5863564" y="3521332"/>
+            <a:ext cx="5882059" cy="1477328"/>
+          </a:xfrm>
+          <a:prstGeom prst="rect">
+            <a:avLst/>
+          </a:prstGeom>
+          <a:noFill/>
+        </p:spPr>
+        <p:txBody>
+          <a:bodyPr wrap="none" rtlCol="0">
+            <a:spAutoFit/>
+          </a:bodyPr>
+          <a:lstStyle/>
+          <a:p>
+            <a:r>
+              <a:rPr lang="en-US" dirty="0"/>
+              <a:t>We specify services for</a:t>
+            </a:r>
+          </a:p>
+          <a:p>
+            <a:pPr marL="285750" indent="-285750">
+              <a:buFont typeface="Arial" panose="020B0604020202020204" pitchFamily="34" charset="0"/>
+              <a:buChar char="•"/>
+            </a:pPr>
+            <a:r>
+              <a:rPr lang="en-US" dirty="0"/>
+              <a:t>Node storage</a:t>
+            </a:r>
+          </a:p>
+          <a:p>
+            <a:pPr marL="285750" indent="-285750">
+              <a:buFont typeface="Arial" panose="020B0604020202020204" pitchFamily="34" charset="0"/>
+              <a:buChar char="•"/>
+            </a:pPr>
+            <a:r>
+              <a:rPr lang="en-US"/>
+              <a:t>Languages</a:t>
+            </a:r>
+            <a:endParaRPr lang="en-US" dirty="0"/>
+          </a:p>
+          <a:p>
+            <a:pPr marL="285750" indent="-285750">
+              <a:buFont typeface="Arial" panose="020B0604020202020204" pitchFamily="34" charset="0"/>
+              <a:buChar char="•"/>
+            </a:pPr>
+            <a:r>
+              <a:rPr lang="en-US" dirty="0"/>
+              <a:t>Derived nodes (e.g. </a:t>
+            </a:r>
+            <a:r>
+              <a:rPr lang="en-US" dirty="0" err="1"/>
+              <a:t>typesystem</a:t>
+            </a:r>
+            <a:r>
+              <a:rPr lang="en-US" dirty="0"/>
+              <a:t>, scopes, interpreters)</a:t>
+            </a:r>
+          </a:p>
+          <a:p>
+            <a:pPr marL="285750" indent="-285750">
+              <a:buFont typeface="Arial" panose="020B0604020202020204" pitchFamily="34" charset="0"/>
+              <a:buChar char="•"/>
+            </a:pPr>
+            <a:r>
+              <a:rPr lang="en-US" dirty="0"/>
+              <a:t>On-demand transformers (e.g. generators, model change)</a:t>
+            </a:r>
+          </a:p>
+        </p:txBody>
+      </p:sp>
+      <p:grpSp>
+        <p:nvGrpSpPr>
+          <p:cNvPr id="64" name="Group 63">
+            <a:extLst>
+              <a:ext uri="{FF2B5EF4-FFF2-40B4-BE49-F238E27FC236}">
+                <a16:creationId xmlns:a16="http://schemas.microsoft.com/office/drawing/2014/main" id="{44427ACE-A38B-4889-0E70-6099E30E2324}"/>
+              </a:ext>
+            </a:extLst>
+          </p:cNvPr>
+          <p:cNvGrpSpPr/>
+          <p:nvPr/>
+        </p:nvGrpSpPr>
+        <p:grpSpPr>
+          <a:xfrm>
+            <a:off x="0" y="1147594"/>
+            <a:ext cx="5694593" cy="4562811"/>
+            <a:chOff x="113455" y="1732305"/>
+            <a:chExt cx="5694593" cy="4562811"/>
+          </a:xfrm>
+        </p:grpSpPr>
+        <p:grpSp>
+          <p:nvGrpSpPr>
+            <p:cNvPr id="63" name="Group 62">
+              <a:extLst>
+                <a:ext uri="{FF2B5EF4-FFF2-40B4-BE49-F238E27FC236}">
+                  <a16:creationId xmlns:a16="http://schemas.microsoft.com/office/drawing/2014/main" id="{6979F69B-22E5-21BC-0B95-36C895BFFB50}"/>
+                </a:ext>
+              </a:extLst>
+            </p:cNvPr>
+            <p:cNvGrpSpPr/>
+            <p:nvPr/>
+          </p:nvGrpSpPr>
+          <p:grpSpPr>
+            <a:xfrm>
+              <a:off x="1936784" y="1732305"/>
+              <a:ext cx="3871264" cy="4562811"/>
+              <a:chOff x="1936784" y="1732305"/>
+              <a:chExt cx="3871264" cy="4562811"/>
+            </a:xfrm>
+          </p:grpSpPr>
+          <p:grpSp>
+            <p:nvGrpSpPr>
+              <p:cNvPr id="60" name="Group 59">
+                <a:extLst>
+                  <a:ext uri="{FF2B5EF4-FFF2-40B4-BE49-F238E27FC236}">
+                    <a16:creationId xmlns:a16="http://schemas.microsoft.com/office/drawing/2014/main" id="{FBB64806-08DF-22A1-534E-4096E2BD436F}"/>
+                  </a:ext>
+                </a:extLst>
+              </p:cNvPr>
+              <p:cNvGrpSpPr/>
+              <p:nvPr/>
+            </p:nvGrpSpPr>
+            <p:grpSpPr>
+              <a:xfrm>
+                <a:off x="1936784" y="1732305"/>
+                <a:ext cx="3871264" cy="4562811"/>
+                <a:chOff x="1936784" y="1732305"/>
+                <a:chExt cx="3871264" cy="4562811"/>
+              </a:xfrm>
+            </p:grpSpPr>
+            <p:sp>
+              <p:nvSpPr>
+                <p:cNvPr id="36" name="Rectangle 35">
+                  <a:extLst>
+                    <a:ext uri="{FF2B5EF4-FFF2-40B4-BE49-F238E27FC236}">
+                      <a16:creationId xmlns:a16="http://schemas.microsoft.com/office/drawing/2014/main" id="{2C7735D9-1539-850B-7E7D-994969884100}"/>
+                    </a:ext>
+                  </a:extLst>
+                </p:cNvPr>
+                <p:cNvSpPr/>
+                <p:nvPr/>
+              </p:nvSpPr>
+              <p:spPr>
+                <a:xfrm>
+                  <a:off x="1936784" y="1732305"/>
+                  <a:ext cx="3871264" cy="4562811"/>
+                </a:xfrm>
+                <a:prstGeom prst="rect">
+                  <a:avLst/>
+                </a:prstGeom>
+                <a:solidFill>
+                  <a:schemeClr val="accent6">
+                    <a:lumMod val="20000"/>
+                    <a:lumOff val="80000"/>
+                  </a:schemeClr>
+                </a:solidFill>
+                <a:ln>
+                  <a:prstDash val="dash"/>
+                </a:ln>
+              </p:spPr>
+              <p:style>
+                <a:lnRef idx="2">
+                  <a:schemeClr val="accent1">
+                    <a:shade val="50000"/>
+                  </a:schemeClr>
+                </a:lnRef>
+                <a:fillRef idx="1">
+                  <a:schemeClr val="accent1"/>
+                </a:fillRef>
+                <a:effectRef idx="0">
+                  <a:schemeClr val="accent1"/>
+                </a:effectRef>
+                <a:fontRef idx="minor">
+                  <a:schemeClr val="lt1"/>
+                </a:fontRef>
+              </p:style>
+              <p:txBody>
+                <a:bodyPr rtlCol="0" anchor="ctr"/>
+                <a:lstStyle/>
+                <a:p>
+                  <a:pPr algn="ctr"/>
+                  <a:endParaRPr lang="en-US"/>
+                </a:p>
+              </p:txBody>
+            </p:sp>
+            <p:sp>
+              <p:nvSpPr>
+                <p:cNvPr id="44" name="TextBox 43">
+                  <a:extLst>
+                    <a:ext uri="{FF2B5EF4-FFF2-40B4-BE49-F238E27FC236}">
+                      <a16:creationId xmlns:a16="http://schemas.microsoft.com/office/drawing/2014/main" id="{0D4E0CBA-E6C3-E74C-2F01-05C8BFFB257D}"/>
+                    </a:ext>
+                  </a:extLst>
+                </p:cNvPr>
+                <p:cNvSpPr txBox="1"/>
+                <p:nvPr/>
+              </p:nvSpPr>
+              <p:spPr>
+                <a:xfrm>
+                  <a:off x="2701935" y="5854210"/>
+                  <a:ext cx="2340962" cy="369332"/>
+                </a:xfrm>
+                <a:prstGeom prst="rect">
+                  <a:avLst/>
+                </a:prstGeom>
+                <a:noFill/>
+              </p:spPr>
+              <p:txBody>
+                <a:bodyPr wrap="none" rtlCol="0">
+                  <a:spAutoFit/>
+                </a:bodyPr>
+                <a:lstStyle/>
+                <a:p>
+                  <a:r>
+                    <a:rPr lang="en-US" dirty="0">
+                      <a:solidFill>
+                        <a:schemeClr val="tx1"/>
+                      </a:solidFill>
+                    </a:rPr>
+                    <a:t>Reference Architecture</a:t>
+                  </a:r>
+                </a:p>
+              </p:txBody>
+            </p:sp>
+          </p:grpSp>
+          <p:grpSp>
+            <p:nvGrpSpPr>
+              <p:cNvPr id="52" name="Group 51">
+                <a:extLst>
+                  <a:ext uri="{FF2B5EF4-FFF2-40B4-BE49-F238E27FC236}">
+                    <a16:creationId xmlns:a16="http://schemas.microsoft.com/office/drawing/2014/main" id="{9C2BE436-B43E-623B-2976-EEE7F55B9B1C}"/>
+                  </a:ext>
+                </a:extLst>
+              </p:cNvPr>
+              <p:cNvGrpSpPr/>
+              <p:nvPr/>
+            </p:nvGrpSpPr>
+            <p:grpSpPr>
+              <a:xfrm>
+                <a:off x="2024117" y="4697420"/>
+                <a:ext cx="3696598" cy="920526"/>
+                <a:chOff x="1993384" y="4697420"/>
+                <a:chExt cx="3696598" cy="920526"/>
+              </a:xfrm>
+            </p:grpSpPr>
+            <p:sp>
+              <p:nvSpPr>
+                <p:cNvPr id="49" name="Rectangle 48">
+                  <a:extLst>
+                    <a:ext uri="{FF2B5EF4-FFF2-40B4-BE49-F238E27FC236}">
+                      <a16:creationId xmlns:a16="http://schemas.microsoft.com/office/drawing/2014/main" id="{25C46A9E-E21D-0CC4-42F5-036F5FA7F44E}"/>
+                    </a:ext>
+                  </a:extLst>
+                </p:cNvPr>
+                <p:cNvSpPr/>
+                <p:nvPr/>
+              </p:nvSpPr>
+              <p:spPr>
+                <a:xfrm>
+                  <a:off x="1993384" y="4697420"/>
+                  <a:ext cx="1158560" cy="914400"/>
+                </a:xfrm>
+                <a:prstGeom prst="rect">
+                  <a:avLst/>
+                </a:prstGeom>
+                <a:solidFill>
+                  <a:schemeClr val="accent6">
+                    <a:lumMod val="60000"/>
+                    <a:lumOff val="40000"/>
+                  </a:schemeClr>
+                </a:solidFill>
+                <a:ln>
+                  <a:solidFill>
+                    <a:schemeClr val="accent6"/>
+                  </a:solidFill>
+                </a:ln>
+              </p:spPr>
+              <p:style>
+                <a:lnRef idx="2">
+                  <a:schemeClr val="accent1">
+                    <a:shade val="50000"/>
+                  </a:schemeClr>
+                </a:lnRef>
+                <a:fillRef idx="1">
+                  <a:schemeClr val="accent1"/>
+                </a:fillRef>
+                <a:effectRef idx="0">
+                  <a:schemeClr val="accent1"/>
+                </a:effectRef>
+                <a:fontRef idx="minor">
+                  <a:schemeClr val="lt1"/>
+                </a:fontRef>
+              </p:style>
+              <p:txBody>
+                <a:bodyPr rtlCol="0" anchor="ctr"/>
+                <a:lstStyle/>
+                <a:p>
+                  <a:pPr algn="ctr"/>
+                  <a:r>
+                    <a:rPr lang="en-US" dirty="0">
+                      <a:solidFill>
+                        <a:schemeClr val="tx1"/>
+                      </a:solidFill>
+                    </a:rPr>
+                    <a:t>Java</a:t>
+                  </a:r>
+                </a:p>
+                <a:p>
+                  <a:pPr algn="ctr"/>
+                  <a:r>
+                    <a:rPr lang="en-US" dirty="0">
+                      <a:solidFill>
+                        <a:schemeClr val="tx1"/>
+                      </a:solidFill>
+                    </a:rPr>
+                    <a:t>connector</a:t>
+                  </a:r>
+                </a:p>
+              </p:txBody>
+            </p:sp>
+            <p:sp>
+              <p:nvSpPr>
+                <p:cNvPr id="50" name="Rectangle 49">
+                  <a:extLst>
+                    <a:ext uri="{FF2B5EF4-FFF2-40B4-BE49-F238E27FC236}">
+                      <a16:creationId xmlns:a16="http://schemas.microsoft.com/office/drawing/2014/main" id="{33717EE6-7AAC-F454-CA58-33B5F3BD8748}"/>
+                    </a:ext>
+                  </a:extLst>
+                </p:cNvPr>
+                <p:cNvSpPr/>
+                <p:nvPr/>
+              </p:nvSpPr>
+              <p:spPr>
+                <a:xfrm>
+                  <a:off x="4531422" y="4703546"/>
+                  <a:ext cx="1158560" cy="914400"/>
+                </a:xfrm>
+                <a:prstGeom prst="rect">
+                  <a:avLst/>
+                </a:prstGeom>
+                <a:solidFill>
+                  <a:schemeClr val="accent6">
+                    <a:lumMod val="60000"/>
+                    <a:lumOff val="40000"/>
+                  </a:schemeClr>
+                </a:solidFill>
+                <a:ln>
+                  <a:solidFill>
+                    <a:schemeClr val="accent6"/>
+                  </a:solidFill>
+                </a:ln>
+              </p:spPr>
+              <p:style>
+                <a:lnRef idx="2">
+                  <a:schemeClr val="accent1">
+                    <a:shade val="50000"/>
+                  </a:schemeClr>
+                </a:lnRef>
+                <a:fillRef idx="1">
+                  <a:schemeClr val="accent1"/>
+                </a:fillRef>
+                <a:effectRef idx="0">
+                  <a:schemeClr val="accent1"/>
+                </a:effectRef>
+                <a:fontRef idx="minor">
+                  <a:schemeClr val="lt1"/>
+                </a:fontRef>
+              </p:style>
+              <p:txBody>
+                <a:bodyPr rtlCol="0" anchor="ctr"/>
+                <a:lstStyle/>
+                <a:p>
+                  <a:pPr algn="ctr"/>
+                  <a:r>
+                    <a:rPr lang="en-US" dirty="0">
+                      <a:solidFill>
+                        <a:schemeClr val="tx1"/>
+                      </a:solidFill>
+                    </a:rPr>
+                    <a:t>TypeScript</a:t>
+                  </a:r>
+                </a:p>
+                <a:p>
+                  <a:pPr algn="ctr"/>
+                  <a:r>
+                    <a:rPr lang="en-US" dirty="0">
+                      <a:solidFill>
+                        <a:schemeClr val="tx1"/>
+                      </a:solidFill>
+                    </a:rPr>
+                    <a:t>connector</a:t>
+                  </a:r>
+                </a:p>
+              </p:txBody>
+            </p:sp>
+            <p:sp>
+              <p:nvSpPr>
+                <p:cNvPr id="51" name="Rectangle 50">
+                  <a:extLst>
+                    <a:ext uri="{FF2B5EF4-FFF2-40B4-BE49-F238E27FC236}">
+                      <a16:creationId xmlns:a16="http://schemas.microsoft.com/office/drawing/2014/main" id="{61ADC959-6448-DEB6-70D3-9435E128FCF0}"/>
+                    </a:ext>
+                  </a:extLst>
+                </p:cNvPr>
+                <p:cNvSpPr/>
+                <p:nvPr/>
+              </p:nvSpPr>
+              <p:spPr>
+                <a:xfrm>
+                  <a:off x="3262403" y="4697420"/>
+                  <a:ext cx="1158560" cy="914400"/>
+                </a:xfrm>
+                <a:prstGeom prst="rect">
+                  <a:avLst/>
+                </a:prstGeom>
+                <a:solidFill>
+                  <a:schemeClr val="accent6">
+                    <a:lumMod val="60000"/>
+                    <a:lumOff val="40000"/>
+                  </a:schemeClr>
+                </a:solidFill>
+                <a:ln>
+                  <a:solidFill>
+                    <a:schemeClr val="accent6"/>
+                  </a:solidFill>
+                </a:ln>
+              </p:spPr>
+              <p:style>
+                <a:lnRef idx="2">
+                  <a:schemeClr val="accent1">
+                    <a:shade val="50000"/>
+                  </a:schemeClr>
+                </a:lnRef>
+                <a:fillRef idx="1">
+                  <a:schemeClr val="accent1"/>
+                </a:fillRef>
+                <a:effectRef idx="0">
+                  <a:schemeClr val="accent1"/>
+                </a:effectRef>
+                <a:fontRef idx="minor">
+                  <a:schemeClr val="lt1"/>
+                </a:fontRef>
+              </p:style>
+              <p:txBody>
+                <a:bodyPr rtlCol="0" anchor="ctr"/>
+                <a:lstStyle/>
+                <a:p>
+                  <a:pPr algn="ctr"/>
+                  <a:r>
+                    <a:rPr lang="en-US" dirty="0">
+                      <a:solidFill>
+                        <a:schemeClr val="tx1"/>
+                      </a:solidFill>
+                    </a:rPr>
+                    <a:t>MPS</a:t>
+                  </a:r>
+                </a:p>
+                <a:p>
+                  <a:pPr algn="ctr"/>
+                  <a:r>
+                    <a:rPr lang="en-US" dirty="0">
+                      <a:solidFill>
+                        <a:schemeClr val="tx1"/>
+                      </a:solidFill>
+                    </a:rPr>
+                    <a:t>connector</a:t>
+                  </a:r>
+                </a:p>
+              </p:txBody>
+            </p:sp>
+          </p:grpSp>
+        </p:grpSp>
+        <p:grpSp>
+          <p:nvGrpSpPr>
+            <p:cNvPr id="59" name="Group 58">
+              <a:extLst>
+                <a:ext uri="{FF2B5EF4-FFF2-40B4-BE49-F238E27FC236}">
+                  <a16:creationId xmlns:a16="http://schemas.microsoft.com/office/drawing/2014/main" id="{936976A1-D8C2-6397-1F45-0D4809AD1A80}"/>
+                </a:ext>
+              </a:extLst>
+            </p:cNvPr>
+            <p:cNvGrpSpPr/>
+            <p:nvPr/>
+          </p:nvGrpSpPr>
+          <p:grpSpPr>
+            <a:xfrm>
+              <a:off x="113455" y="1797259"/>
+              <a:ext cx="5043415" cy="2586133"/>
+              <a:chOff x="113455" y="1797259"/>
+              <a:chExt cx="5043415" cy="2586133"/>
+            </a:xfrm>
+          </p:grpSpPr>
+          <p:sp>
+            <p:nvSpPr>
+              <p:cNvPr id="38" name="TextBox 37">
+                <a:extLst>
+                  <a:ext uri="{FF2B5EF4-FFF2-40B4-BE49-F238E27FC236}">
+                    <a16:creationId xmlns:a16="http://schemas.microsoft.com/office/drawing/2014/main" id="{92A08721-EEC7-CA6D-6DF5-B9C56675C34A}"/>
+                  </a:ext>
+                </a:extLst>
+              </p:cNvPr>
+              <p:cNvSpPr txBox="1"/>
+              <p:nvPr/>
+            </p:nvSpPr>
+            <p:spPr>
+              <a:xfrm>
+                <a:off x="113455" y="2767158"/>
+                <a:ext cx="1017779" cy="646331"/>
+              </a:xfrm>
+              <a:prstGeom prst="rect">
+                <a:avLst/>
+              </a:prstGeom>
+              <a:noFill/>
+            </p:spPr>
+            <p:txBody>
+              <a:bodyPr wrap="none" rtlCol="0">
+                <a:spAutoFit/>
+              </a:bodyPr>
+              <a:lstStyle/>
+              <a:p>
+                <a:pPr algn="r"/>
+                <a:r>
+                  <a:rPr lang="en-US" dirty="0" err="1">
+                    <a:solidFill>
+                      <a:srgbClr val="2F528F"/>
+                    </a:solidFill>
+                  </a:rPr>
+                  <a:t>LIonWeb</a:t>
+                </a:r>
+                <a:br>
+                  <a:rPr lang="en-US" dirty="0">
+                    <a:solidFill>
+                      <a:srgbClr val="2F528F"/>
+                    </a:solidFill>
+                  </a:rPr>
+                </a:br>
+                <a:r>
+                  <a:rPr lang="en-US" dirty="0">
+                    <a:solidFill>
+                      <a:srgbClr val="2F528F"/>
+                    </a:solidFill>
+                  </a:rPr>
+                  <a:t>Spec</a:t>
+                </a:r>
+              </a:p>
+            </p:txBody>
+          </p:sp>
+          <p:sp>
+            <p:nvSpPr>
+              <p:cNvPr id="45" name="Left Brace 44">
+                <a:extLst>
+                  <a:ext uri="{FF2B5EF4-FFF2-40B4-BE49-F238E27FC236}">
+                    <a16:creationId xmlns:a16="http://schemas.microsoft.com/office/drawing/2014/main" id="{DBE5703D-D21A-A652-06A0-9EFBDA287F26}"/>
+                  </a:ext>
+                </a:extLst>
+              </p:cNvPr>
+              <p:cNvSpPr/>
+              <p:nvPr/>
+            </p:nvSpPr>
+            <p:spPr>
+              <a:xfrm>
+                <a:off x="1131234" y="1797259"/>
+                <a:ext cx="645135" cy="2586131"/>
+              </a:xfrm>
+              <a:prstGeom prst="leftBrace">
+                <a:avLst>
+                  <a:gd name="adj1" fmla="val 31125"/>
+                  <a:gd name="adj2" fmla="val 50000"/>
+                </a:avLst>
+              </a:prstGeom>
+              <a:noFill/>
+            </p:spPr>
+            <p:style>
+              <a:lnRef idx="2">
+                <a:schemeClr val="accent1">
+                  <a:shade val="50000"/>
+                </a:schemeClr>
+              </a:lnRef>
+              <a:fillRef idx="1">
+                <a:schemeClr val="accent1"/>
+              </a:fillRef>
+              <a:effectRef idx="0">
+                <a:schemeClr val="accent1"/>
+              </a:effectRef>
+              <a:fontRef idx="minor">
+                <a:schemeClr val="lt1"/>
+              </a:fontRef>
+            </p:style>
+            <p:txBody>
+              <a:bodyPr rtlCol="0" anchor="ctr"/>
+              <a:lstStyle/>
+              <a:p>
+                <a:pPr algn="ctr"/>
+                <a:endParaRPr lang="en-US"/>
+              </a:p>
+            </p:txBody>
+          </p:sp>
+          <p:grpSp>
+            <p:nvGrpSpPr>
+              <p:cNvPr id="55" name="Group 54">
+                <a:extLst>
+                  <a:ext uri="{FF2B5EF4-FFF2-40B4-BE49-F238E27FC236}">
+                    <a16:creationId xmlns:a16="http://schemas.microsoft.com/office/drawing/2014/main" id="{D2CA4C41-2883-FDE6-717C-4CACEE9642BB}"/>
+                  </a:ext>
+                </a:extLst>
+              </p:cNvPr>
+              <p:cNvGrpSpPr/>
+              <p:nvPr/>
+            </p:nvGrpSpPr>
+            <p:grpSpPr>
+              <a:xfrm>
+                <a:off x="2587962" y="1797260"/>
+                <a:ext cx="2568908" cy="2586132"/>
+                <a:chOff x="1998814" y="1797260"/>
+                <a:chExt cx="2568908" cy="2586132"/>
+              </a:xfrm>
+            </p:grpSpPr>
+            <p:grpSp>
+              <p:nvGrpSpPr>
+                <p:cNvPr id="54" name="Group 53">
+                  <a:extLst>
+                    <a:ext uri="{FF2B5EF4-FFF2-40B4-BE49-F238E27FC236}">
+                      <a16:creationId xmlns:a16="http://schemas.microsoft.com/office/drawing/2014/main" id="{75690E9B-9B77-966A-CE8E-E79F95562F75}"/>
+                    </a:ext>
+                  </a:extLst>
+                </p:cNvPr>
+                <p:cNvGrpSpPr/>
+                <p:nvPr/>
+              </p:nvGrpSpPr>
+              <p:grpSpPr>
+                <a:xfrm>
+                  <a:off x="1998814" y="1797260"/>
+                  <a:ext cx="2568908" cy="2586132"/>
+                  <a:chOff x="1998814" y="1797260"/>
+                  <a:chExt cx="2568908" cy="2586132"/>
+                </a:xfrm>
+              </p:grpSpPr>
+              <p:sp>
+                <p:nvSpPr>
+                  <p:cNvPr id="4" name="Oval 3">
+                    <a:extLst>
+                      <a:ext uri="{FF2B5EF4-FFF2-40B4-BE49-F238E27FC236}">
+                        <a16:creationId xmlns:a16="http://schemas.microsoft.com/office/drawing/2014/main" id="{4DDFE7D6-BAA5-20CF-747D-210DB14C51E0}"/>
+                      </a:ext>
+                    </a:extLst>
+                  </p:cNvPr>
+                  <p:cNvSpPr/>
+                  <p:nvPr/>
+                </p:nvSpPr>
+                <p:spPr>
+                  <a:xfrm>
+                    <a:off x="1998814" y="1797260"/>
+                    <a:ext cx="2568908" cy="2586132"/>
+                  </a:xfrm>
+                  <a:prstGeom prst="ellipse">
+                    <a:avLst/>
+                  </a:prstGeom>
+                  <a:solidFill>
+                    <a:schemeClr val="accent1">
+                      <a:lumMod val="20000"/>
+                      <a:lumOff val="80000"/>
+                    </a:schemeClr>
+                  </a:solidFill>
+                </p:spPr>
+                <p:style>
+                  <a:lnRef idx="2">
+                    <a:schemeClr val="accent1">
+                      <a:shade val="50000"/>
+                    </a:schemeClr>
+                  </a:lnRef>
+                  <a:fillRef idx="1">
+                    <a:schemeClr val="accent1"/>
+                  </a:fillRef>
+                  <a:effectRef idx="0">
+                    <a:schemeClr val="accent1"/>
+                  </a:effectRef>
+                  <a:fontRef idx="minor">
+                    <a:schemeClr val="lt1"/>
+                  </a:fontRef>
+                </p:style>
+                <p:txBody>
+                  <a:bodyPr wrap="square" tIns="0" rtlCol="0" anchor="b" anchorCtr="0"/>
+                  <a:lstStyle/>
+                  <a:p>
+                    <a:pPr algn="ctr"/>
+                    <a:endParaRPr lang="en-US" dirty="0">
+                      <a:solidFill>
+                        <a:schemeClr val="tx1"/>
+                      </a:solidFill>
+                    </a:endParaRPr>
+                  </a:p>
+                </p:txBody>
+              </p:sp>
+              <p:sp>
+                <p:nvSpPr>
+                  <p:cNvPr id="19" name="TextBox 18">
+                    <a:extLst>
+                      <a:ext uri="{FF2B5EF4-FFF2-40B4-BE49-F238E27FC236}">
+                        <a16:creationId xmlns:a16="http://schemas.microsoft.com/office/drawing/2014/main" id="{EB9C078D-059E-BC29-1A73-23081753E1DB}"/>
+                      </a:ext>
+                    </a:extLst>
+                  </p:cNvPr>
+                  <p:cNvSpPr txBox="1"/>
+                  <p:nvPr/>
+                </p:nvSpPr>
+                <p:spPr>
+                  <a:xfrm>
+                    <a:off x="2809164" y="3953368"/>
+                    <a:ext cx="948208" cy="369332"/>
+                  </a:xfrm>
+                  <a:prstGeom prst="rect">
+                    <a:avLst/>
+                  </a:prstGeom>
+                  <a:noFill/>
+                </p:spPr>
+                <p:txBody>
+                  <a:bodyPr wrap="none" rtlCol="0">
+                    <a:spAutoFit/>
+                  </a:bodyPr>
+                  <a:lstStyle/>
+                  <a:p>
+                    <a:r>
+                      <a:rPr lang="en-US" dirty="0">
+                        <a:solidFill>
+                          <a:schemeClr val="tx1"/>
+                        </a:solidFill>
+                      </a:rPr>
+                      <a:t>Services</a:t>
+                    </a:r>
+                  </a:p>
+                </p:txBody>
+              </p:sp>
+            </p:grpSp>
+            <p:grpSp>
+              <p:nvGrpSpPr>
+                <p:cNvPr id="53" name="Group 52">
+                  <a:extLst>
+                    <a:ext uri="{FF2B5EF4-FFF2-40B4-BE49-F238E27FC236}">
+                      <a16:creationId xmlns:a16="http://schemas.microsoft.com/office/drawing/2014/main" id="{BC7A53F2-53E3-8E29-6FD9-FFA46E8C3FF4}"/>
+                    </a:ext>
+                  </a:extLst>
+                </p:cNvPr>
+                <p:cNvGrpSpPr/>
+                <p:nvPr/>
+              </p:nvGrpSpPr>
+              <p:grpSpPr>
+                <a:xfrm>
+                  <a:off x="2233148" y="1871784"/>
+                  <a:ext cx="2100241" cy="2100241"/>
+                  <a:chOff x="2233148" y="1871784"/>
+                  <a:chExt cx="2100241" cy="2100241"/>
+                </a:xfrm>
+              </p:grpSpPr>
+              <p:sp>
+                <p:nvSpPr>
+                  <p:cNvPr id="5" name="Oval 4">
+                    <a:extLst>
+                      <a:ext uri="{FF2B5EF4-FFF2-40B4-BE49-F238E27FC236}">
+                        <a16:creationId xmlns:a16="http://schemas.microsoft.com/office/drawing/2014/main" id="{3D2EA811-8E7F-8D56-57B2-126FE89C2F8B}"/>
+                      </a:ext>
+                    </a:extLst>
+                  </p:cNvPr>
+                  <p:cNvSpPr/>
+                  <p:nvPr/>
+                </p:nvSpPr>
+                <p:spPr>
+                  <a:xfrm>
+                    <a:off x="2233148" y="1871784"/>
+                    <a:ext cx="2100241" cy="2100241"/>
+                  </a:xfrm>
+                  <a:prstGeom prst="ellipse">
+                    <a:avLst/>
+                  </a:prstGeom>
+                  <a:solidFill>
+                    <a:schemeClr val="accent1">
+                      <a:lumMod val="40000"/>
+                      <a:lumOff val="60000"/>
+                    </a:schemeClr>
+                  </a:solidFill>
+                </p:spPr>
+                <p:style>
+                  <a:lnRef idx="2">
+                    <a:schemeClr val="accent1">
+                      <a:shade val="50000"/>
+                    </a:schemeClr>
+                  </a:lnRef>
+                  <a:fillRef idx="1">
+                    <a:schemeClr val="accent1"/>
+                  </a:fillRef>
+                  <a:effectRef idx="0">
+                    <a:schemeClr val="accent1"/>
+                  </a:effectRef>
+                  <a:fontRef idx="minor">
+                    <a:schemeClr val="lt1"/>
+                  </a:fontRef>
+                </p:style>
+                <p:txBody>
+                  <a:bodyPr tIns="0" rtlCol="0" anchor="b" anchorCtr="0"/>
+                  <a:lstStyle/>
+                  <a:p>
+                    <a:pPr algn="ctr"/>
+                    <a:endParaRPr lang="en-US" dirty="0">
+                      <a:solidFill>
+                        <a:schemeClr val="tx1"/>
+                      </a:solidFill>
+                    </a:endParaRPr>
+                  </a:p>
+                </p:txBody>
+              </p:sp>
+              <p:sp>
+                <p:nvSpPr>
+                  <p:cNvPr id="17" name="TextBox 16">
+                    <a:extLst>
+                      <a:ext uri="{FF2B5EF4-FFF2-40B4-BE49-F238E27FC236}">
+                        <a16:creationId xmlns:a16="http://schemas.microsoft.com/office/drawing/2014/main" id="{488C8124-F624-6F9C-C24E-BE4EA18D426C}"/>
+                      </a:ext>
+                    </a:extLst>
+                  </p:cNvPr>
+                  <p:cNvSpPr txBox="1"/>
+                  <p:nvPr/>
+                </p:nvSpPr>
+                <p:spPr>
+                  <a:xfrm>
+                    <a:off x="2872643" y="3184563"/>
+                    <a:ext cx="821250" cy="646331"/>
+                  </a:xfrm>
+                  <a:prstGeom prst="rect">
+                    <a:avLst/>
+                  </a:prstGeom>
+                  <a:noFill/>
+                </p:spPr>
+                <p:txBody>
+                  <a:bodyPr wrap="none" rtlCol="0">
+                    <a:spAutoFit/>
+                  </a:bodyPr>
+                  <a:lstStyle/>
+                  <a:p>
+                    <a:pPr algn="ctr"/>
+                    <a:r>
+                      <a:rPr lang="en-US" sz="1200" dirty="0"/>
+                      <a:t>Messages</a:t>
+                    </a:r>
+                  </a:p>
+                  <a:p>
+                    <a:pPr algn="ctr"/>
+                    <a:r>
+                      <a:rPr lang="en-US" sz="1200" dirty="0"/>
+                      <a:t>Data</a:t>
+                    </a:r>
+                  </a:p>
+                  <a:p>
+                    <a:pPr algn="ctr"/>
+                    <a:r>
+                      <a:rPr lang="en-US" sz="1200" dirty="0"/>
+                      <a:t>Semantics</a:t>
+                    </a:r>
+                  </a:p>
+                </p:txBody>
+              </p:sp>
+              <p:sp>
+                <p:nvSpPr>
+                  <p:cNvPr id="18" name="TextBox 17">
+                    <a:extLst>
+                      <a:ext uri="{FF2B5EF4-FFF2-40B4-BE49-F238E27FC236}">
+                        <a16:creationId xmlns:a16="http://schemas.microsoft.com/office/drawing/2014/main" id="{ECE01A5A-76AC-453F-505A-DE768C5193A0}"/>
+                      </a:ext>
+                    </a:extLst>
+                  </p:cNvPr>
+                  <p:cNvSpPr txBox="1"/>
+                  <p:nvPr/>
+                </p:nvSpPr>
+                <p:spPr>
+                  <a:xfrm>
+                    <a:off x="2754053" y="2952859"/>
+                    <a:ext cx="1058431" cy="369332"/>
+                  </a:xfrm>
+                  <a:prstGeom prst="rect">
+                    <a:avLst/>
+                  </a:prstGeom>
+                  <a:noFill/>
+                </p:spPr>
+                <p:txBody>
+                  <a:bodyPr wrap="none" rtlCol="0">
+                    <a:spAutoFit/>
+                  </a:bodyPr>
+                  <a:lstStyle/>
+                  <a:p>
+                    <a:r>
+                      <a:rPr lang="en-US" dirty="0"/>
+                      <a:t>Protocols</a:t>
+                    </a:r>
+                  </a:p>
+                </p:txBody>
+              </p:sp>
+            </p:grpSp>
+            <p:sp>
+              <p:nvSpPr>
+                <p:cNvPr id="8" name="Oval 7">
+                  <a:extLst>
+                    <a:ext uri="{FF2B5EF4-FFF2-40B4-BE49-F238E27FC236}">
+                      <a16:creationId xmlns:a16="http://schemas.microsoft.com/office/drawing/2014/main" id="{71E00E67-1A4D-8042-F2BD-206F08C5E65C}"/>
+                    </a:ext>
+                  </a:extLst>
+                </p:cNvPr>
+                <p:cNvSpPr/>
+                <p:nvPr/>
+              </p:nvSpPr>
+              <p:spPr>
+                <a:xfrm>
+                  <a:off x="2894648" y="2001486"/>
+                  <a:ext cx="777240" cy="777240"/>
+                </a:xfrm>
+                <a:prstGeom prst="ellipse">
+                  <a:avLst/>
+                </a:prstGeom>
+                <a:solidFill>
+                  <a:schemeClr val="accent1">
+                    <a:lumMod val="60000"/>
+                    <a:lumOff val="40000"/>
+                  </a:schemeClr>
+                </a:solidFill>
+              </p:spPr>
+              <p:style>
+                <a:lnRef idx="2">
+                  <a:schemeClr val="accent1">
+                    <a:shade val="50000"/>
+                  </a:schemeClr>
+                </a:lnRef>
+                <a:fillRef idx="1">
+                  <a:schemeClr val="accent1"/>
+                </a:fillRef>
+                <a:effectRef idx="0">
+                  <a:schemeClr val="accent1"/>
+                </a:effectRef>
+                <a:fontRef idx="minor">
+                  <a:schemeClr val="lt1"/>
+                </a:fontRef>
+              </p:style>
+              <p:txBody>
+                <a:bodyPr rtlCol="0" anchor="ctr"/>
+                <a:lstStyle/>
+                <a:p>
+                  <a:pPr algn="ctr"/>
+                  <a:r>
+                    <a:rPr lang="en-US" dirty="0">
+                      <a:solidFill>
+                        <a:schemeClr val="tx1"/>
+                      </a:solidFill>
+                    </a:rPr>
+                    <a:t>M3</a:t>
+                  </a:r>
+                </a:p>
+              </p:txBody>
+            </p:sp>
+          </p:grpSp>
+        </p:grpSp>
+      </p:grpSp>
+      <p:cxnSp>
+        <p:nvCxnSpPr>
+          <p:cNvPr id="12" name="Straight Connector 11">
+            <a:extLst>
+              <a:ext uri="{FF2B5EF4-FFF2-40B4-BE49-F238E27FC236}">
+                <a16:creationId xmlns:a16="http://schemas.microsoft.com/office/drawing/2014/main" id="{99B8CAFC-42BB-3840-8084-E58D37674EFA}"/>
+              </a:ext>
+            </a:extLst>
+          </p:cNvPr>
+          <p:cNvCxnSpPr>
+            <a:cxnSpLocks/>
+            <a:stCxn id="8" idx="7"/>
+            <a:endCxn id="15" idx="1"/>
+          </p:cNvCxnSpPr>
+          <p:nvPr/>
+        </p:nvCxnSpPr>
+        <p:spPr>
+          <a:xfrm flipV="1">
+            <a:off x="4033757" y="683166"/>
+            <a:ext cx="1829807" cy="847433"/>
+          </a:xfrm>
+          <a:prstGeom prst="line">
+            <a:avLst/>
+          </a:prstGeom>
+          <a:ln w="28575"/>
+        </p:spPr>
+        <p:style>
+          <a:lnRef idx="1">
+            <a:schemeClr val="dk1"/>
+          </a:lnRef>
+          <a:fillRef idx="0">
+            <a:schemeClr val="dk1"/>
+          </a:fillRef>
+          <a:effectRef idx="0">
+            <a:schemeClr val="dk1"/>
+          </a:effectRef>
+          <a:fontRef idx="minor">
+            <a:schemeClr val="tx1"/>
+          </a:fontRef>
+        </p:style>
+      </p:cxnSp>
+      <p:cxnSp>
+        <p:nvCxnSpPr>
+          <p:cNvPr id="27" name="Straight Connector 26">
+            <a:extLst>
+              <a:ext uri="{FF2B5EF4-FFF2-40B4-BE49-F238E27FC236}">
+                <a16:creationId xmlns:a16="http://schemas.microsoft.com/office/drawing/2014/main" id="{7A23E311-F67B-9356-AED3-132F0F0F53EC}"/>
+              </a:ext>
+            </a:extLst>
+          </p:cNvPr>
+          <p:cNvCxnSpPr>
+            <a:cxnSpLocks/>
+            <a:stCxn id="5" idx="7"/>
+            <a:endCxn id="28" idx="1"/>
+          </p:cNvCxnSpPr>
+          <p:nvPr/>
+        </p:nvCxnSpPr>
+        <p:spPr>
+          <a:xfrm>
+            <a:off x="4501509" y="1594646"/>
+            <a:ext cx="1362375" cy="669186"/>
+          </a:xfrm>
+          <a:prstGeom prst="line">
+            <a:avLst/>
+          </a:prstGeom>
+          <a:ln w="28575"/>
+        </p:spPr>
+        <p:style>
+          <a:lnRef idx="1">
+            <a:schemeClr val="dk1"/>
+          </a:lnRef>
+          <a:fillRef idx="0">
+            <a:schemeClr val="dk1"/>
+          </a:fillRef>
+          <a:effectRef idx="0">
+            <a:schemeClr val="dk1"/>
+          </a:effectRef>
+          <a:fontRef idx="minor">
+            <a:schemeClr val="tx1"/>
+          </a:fontRef>
+        </p:style>
+      </p:cxnSp>
+      <p:cxnSp>
+        <p:nvCxnSpPr>
+          <p:cNvPr id="29" name="Straight Connector 28">
+            <a:extLst>
+              <a:ext uri="{FF2B5EF4-FFF2-40B4-BE49-F238E27FC236}">
+                <a16:creationId xmlns:a16="http://schemas.microsoft.com/office/drawing/2014/main" id="{C42472F5-2D23-9F89-2B3D-3B37D0329A7B}"/>
+              </a:ext>
+            </a:extLst>
+          </p:cNvPr>
+          <p:cNvCxnSpPr>
+            <a:cxnSpLocks/>
+            <a:stCxn id="4" idx="5"/>
+            <a:endCxn id="30" idx="1"/>
+          </p:cNvCxnSpPr>
+          <p:nvPr/>
+        </p:nvCxnSpPr>
+        <p:spPr>
+          <a:xfrm>
+            <a:off x="4667207" y="3419951"/>
+            <a:ext cx="1196357" cy="840045"/>
+          </a:xfrm>
+          <a:prstGeom prst="line">
+            <a:avLst/>
+          </a:prstGeom>
+          <a:ln w="28575"/>
+        </p:spPr>
+        <p:style>
+          <a:lnRef idx="1">
+            <a:schemeClr val="dk1"/>
+          </a:lnRef>
+          <a:fillRef idx="0">
+            <a:schemeClr val="dk1"/>
+          </a:fillRef>
+          <a:effectRef idx="0">
+            <a:schemeClr val="dk1"/>
+          </a:effectRef>
+          <a:fontRef idx="minor">
+            <a:schemeClr val="tx1"/>
+          </a:fontRef>
+        </p:style>
+      </p:cxnSp>
+      <p:sp>
+        <p:nvSpPr>
+          <p:cNvPr id="69" name="TextBox 68">
+            <a:extLst>
+              <a:ext uri="{FF2B5EF4-FFF2-40B4-BE49-F238E27FC236}">
+                <a16:creationId xmlns:a16="http://schemas.microsoft.com/office/drawing/2014/main" id="{517808CB-7C7F-A43C-C4E9-9F483530ED97}"/>
+              </a:ext>
+            </a:extLst>
+          </p:cNvPr>
+          <p:cNvSpPr txBox="1"/>
+          <p:nvPr/>
+        </p:nvSpPr>
+        <p:spPr>
+          <a:xfrm>
+            <a:off x="5863564" y="5240498"/>
+            <a:ext cx="4615815" cy="369332"/>
+          </a:xfrm>
+          <a:prstGeom prst="rect">
+            <a:avLst/>
+          </a:prstGeom>
+          <a:noFill/>
+        </p:spPr>
+        <p:txBody>
+          <a:bodyPr wrap="none" rtlCol="0">
+            <a:spAutoFit/>
+          </a:bodyPr>
+          <a:lstStyle/>
+          <a:p>
+            <a:r>
+              <a:rPr lang="en-US" dirty="0"/>
+              <a:t>We provide default connectors to the protocols</a:t>
+            </a:r>
+          </a:p>
+        </p:txBody>
+      </p:sp>
+      <p:cxnSp>
+        <p:nvCxnSpPr>
+          <p:cNvPr id="70" name="Straight Connector 69">
+            <a:extLst>
+              <a:ext uri="{FF2B5EF4-FFF2-40B4-BE49-F238E27FC236}">
+                <a16:creationId xmlns:a16="http://schemas.microsoft.com/office/drawing/2014/main" id="{AB001C41-6C4F-BDB8-9F79-82D6CF05B9CB}"/>
+              </a:ext>
+            </a:extLst>
+          </p:cNvPr>
+          <p:cNvCxnSpPr>
+            <a:cxnSpLocks/>
+            <a:stCxn id="50" idx="3"/>
+            <a:endCxn id="69" idx="1"/>
+          </p:cNvCxnSpPr>
+          <p:nvPr/>
+        </p:nvCxnSpPr>
+        <p:spPr>
+          <a:xfrm>
+            <a:off x="5607260" y="4576035"/>
+            <a:ext cx="256304" cy="849129"/>
+          </a:xfrm>
+          <a:prstGeom prst="line">
+            <a:avLst/>
+          </a:prstGeom>
+          <a:ln w="28575"/>
+        </p:spPr>
+        <p:style>
+          <a:lnRef idx="1">
+            <a:schemeClr val="dk1"/>
+          </a:lnRef>
+          <a:fillRef idx="0">
+            <a:schemeClr val="dk1"/>
+          </a:fillRef>
+          <a:effectRef idx="0">
+            <a:schemeClr val="dk1"/>
+          </a:effectRef>
+          <a:fontRef idx="minor">
+            <a:schemeClr val="tx1"/>
+          </a:fontRef>
+        </p:style>
+      </p:cxnSp>
+      <p:sp>
+        <p:nvSpPr>
+          <p:cNvPr id="74" name="TextBox 73">
+            <a:extLst>
+              <a:ext uri="{FF2B5EF4-FFF2-40B4-BE49-F238E27FC236}">
+                <a16:creationId xmlns:a16="http://schemas.microsoft.com/office/drawing/2014/main" id="{527D7F10-B990-3B75-8102-8B7B86A1DB59}"/>
+              </a:ext>
+            </a:extLst>
+          </p:cNvPr>
+          <p:cNvSpPr txBox="1"/>
+          <p:nvPr/>
+        </p:nvSpPr>
+        <p:spPr>
+          <a:xfrm>
+            <a:off x="5863564" y="5851668"/>
+            <a:ext cx="3625031" cy="646331"/>
+          </a:xfrm>
+          <a:prstGeom prst="rect">
+            <a:avLst/>
+          </a:prstGeom>
+          <a:noFill/>
+        </p:spPr>
+        <p:txBody>
+          <a:bodyPr wrap="none" rtlCol="0">
+            <a:spAutoFit/>
+          </a:bodyPr>
+          <a:lstStyle/>
+          <a:p>
+            <a:r>
+              <a:rPr lang="en-US" dirty="0"/>
+              <a:t>We propose a reference architecture</a:t>
+            </a:r>
+          </a:p>
+          <a:p>
+            <a:r>
+              <a:rPr lang="en-US" dirty="0"/>
+              <a:t>how to set up a </a:t>
+            </a:r>
+            <a:r>
+              <a:rPr lang="en-US" dirty="0" err="1"/>
+              <a:t>LIonWeb</a:t>
+            </a:r>
+            <a:r>
+              <a:rPr lang="en-US" dirty="0"/>
+              <a:t> system</a:t>
+            </a:r>
+          </a:p>
+        </p:txBody>
+      </p:sp>
+      <p:cxnSp>
+        <p:nvCxnSpPr>
+          <p:cNvPr id="75" name="Straight Connector 74">
+            <a:extLst>
+              <a:ext uri="{FF2B5EF4-FFF2-40B4-BE49-F238E27FC236}">
+                <a16:creationId xmlns:a16="http://schemas.microsoft.com/office/drawing/2014/main" id="{DA448806-E38B-611C-1C86-1511DF3B3872}"/>
+              </a:ext>
+            </a:extLst>
+          </p:cNvPr>
+          <p:cNvCxnSpPr>
+            <a:cxnSpLocks/>
+            <a:stCxn id="36" idx="2"/>
+            <a:endCxn id="74" idx="1"/>
+          </p:cNvCxnSpPr>
+          <p:nvPr/>
+        </p:nvCxnSpPr>
+        <p:spPr>
+          <a:xfrm>
+            <a:off x="3758961" y="5710405"/>
+            <a:ext cx="2104603" cy="464429"/>
+          </a:xfrm>
+          <a:prstGeom prst="line">
+            <a:avLst/>
+          </a:prstGeom>
+          <a:ln w="28575"/>
+        </p:spPr>
+        <p:style>
+          <a:lnRef idx="1">
+            <a:schemeClr val="dk1"/>
+          </a:lnRef>
+          <a:fillRef idx="0">
+            <a:schemeClr val="dk1"/>
+          </a:fillRef>
+          <a:effectRef idx="0">
+            <a:schemeClr val="dk1"/>
+          </a:effectRef>
+          <a:fontRef idx="minor">
+            <a:schemeClr val="tx1"/>
+          </a:fontRef>
+        </p:style>
+      </p:cxnSp>
+    </p:spTree>
+    <p:extLst>
+      <p:ext uri="{BB962C8B-B14F-4D97-AF65-F5344CB8AC3E}">
+        <p14:creationId xmlns:p14="http://schemas.microsoft.com/office/powerpoint/2010/main" val="273073250"/>
+      </p:ext>
+    </p:extLst>
+  </p:cSld>
+  <p:clrMapOvr>
+    <a:masterClrMapping/>
+  </p:clrMapOvr>
+</p:sld>
+</file>
+
 <file path=ppt/theme/theme1.xml><?xml version="1.0" encoding="utf-8"?>
 <a:theme xmlns:a="http://schemas.openxmlformats.org/drawingml/2006/main" name="Office Theme">
   <a:themeElements>

</xml_diff>